<commit_message>
implemented minor corrections to init chart
</commit_message>
<xml_diff>
--- a/latex/graphics/init_chart.pptx
+++ b/latex/graphics/init_chart.pptx
@@ -8,7 +8,7 @@
     <p:sldId id="256" r:id="rId2"/>
   </p:sldIdLst>
   <p:sldSz cx="6858000" cy="9906000" type="A4"/>
-  <p:notesSz cx="6858000" cy="9144000"/>
+  <p:notesSz cx="6669088" cy="9926638"/>
   <p:defaultTextStyle>
     <a:defPPr>
       <a:defRPr lang="de-DE"/>
@@ -3657,7 +3657,7 @@
         <p:spPr>
           <a:xfrm>
             <a:off x="3641107" y="2850908"/>
-            <a:ext cx="2419445" cy="292388"/>
+            <a:ext cx="1221296" cy="292388"/>
           </a:xfrm>
           <a:prstGeom prst="rect">
             <a:avLst/>
@@ -3676,8 +3676,13 @@
             </a:r>
             <a:r>
               <a:rPr lang="de-CH" sz="1300" dirty="0"/>
-              <a:t> Transformation Matrix</a:t>
-            </a:r>
+              <a:t> </a:t>
+            </a:r>
+            <a:r>
+              <a:rPr lang="de-CH" sz="1300" dirty="0" smtClean="0"/>
+              <a:t>Pose</a:t>
+            </a:r>
+            <a:endParaRPr lang="de-CH" sz="1300" dirty="0"/>
           </a:p>
         </p:txBody>
       </p:sp>
@@ -3759,7 +3764,7 @@
         <p:spPr>
           <a:xfrm>
             <a:off x="3701307" y="4677852"/>
-            <a:ext cx="2259914" cy="492443"/>
+            <a:ext cx="1478738" cy="530915"/>
           </a:xfrm>
           <a:prstGeom prst="rect">
             <a:avLst/>
@@ -3772,14 +3777,24 @@
           </a:bodyPr>
           <a:lstStyle/>
           <a:p>
+            <a:pPr>
+              <a:spcAft>
+                <a:spcPts val="300"/>
+              </a:spcAft>
+            </a:pPr>
             <a:r>
               <a:rPr lang="de-CH" sz="1300" dirty="0" err="1"/>
               <a:t>Refined</a:t>
             </a:r>
             <a:r>
               <a:rPr lang="de-CH" sz="1300" dirty="0"/>
-              <a:t> Transformation Matrix</a:t>
-            </a:r>
+              <a:t> </a:t>
+            </a:r>
+            <a:r>
+              <a:rPr lang="de-CH" sz="1300" dirty="0" smtClean="0"/>
+              <a:t>Pose</a:t>
+            </a:r>
+            <a:endParaRPr lang="de-CH" sz="1300" dirty="0"/>
           </a:p>
           <a:p>
             <a:r>
@@ -3838,7 +3853,7 @@
         <p:spPr>
           <a:xfrm>
             <a:off x="3710851" y="5741365"/>
-            <a:ext cx="2762423" cy="692497"/>
+            <a:ext cx="2762423" cy="769441"/>
           </a:xfrm>
           <a:prstGeom prst="rect">
             <a:avLst/>
@@ -3851,6 +3866,11 @@
           </a:bodyPr>
           <a:lstStyle/>
           <a:p>
+            <a:pPr>
+              <a:spcAft>
+                <a:spcPts val="300"/>
+              </a:spcAft>
+            </a:pPr>
             <a:r>
               <a:rPr lang="de-CH" sz="1300" dirty="0" smtClean="0"/>
               <a:t>Transformation </a:t>
@@ -3882,23 +3902,32 @@
             <a:endParaRPr lang="de-CH" sz="1300" dirty="0"/>
           </a:p>
           <a:p>
+            <a:pPr>
+              <a:spcAft>
+                <a:spcPts val="300"/>
+              </a:spcAft>
+            </a:pPr>
+            <a:r>
+              <a:rPr lang="de-CH" sz="1300" dirty="0" smtClean="0"/>
+              <a:t>Initialisation </a:t>
+            </a:r>
             <a:r>
               <a:rPr lang="de-CH" sz="1300" dirty="0" err="1" smtClean="0"/>
-              <a:t>Initialisation</a:t>
+              <a:t>Keypoints</a:t>
             </a:r>
             <a:r>
               <a:rPr lang="de-CH" sz="1300" dirty="0" smtClean="0"/>
               <a:t> </a:t>
             </a:r>
+          </a:p>
+          <a:p>
+            <a:pPr>
+              <a:spcAft>
+                <a:spcPts val="300"/>
+              </a:spcAft>
+            </a:pPr>
             <a:r>
               <a:rPr lang="de-CH" sz="1300" dirty="0" err="1" smtClean="0"/>
-              <a:t>Keypoints</a:t>
-            </a:r>
-            <a:endParaRPr lang="de-CH" sz="1300" dirty="0"/>
-          </a:p>
-          <a:p>
-            <a:r>
-              <a:rPr lang="de-CH" sz="1300" dirty="0" err="1"/>
               <a:t>a</a:t>
             </a:r>
             <a:r>
@@ -4026,13 +4055,15 @@
       <p:cxnSp>
         <p:nvCxnSpPr>
           <p:cNvPr id="26" name="Straight Arrow Connector 25"/>
-          <p:cNvCxnSpPr/>
+          <p:cNvCxnSpPr>
+            <a:stCxn id="21" idx="2"/>
+          </p:cNvCxnSpPr>
           <p:nvPr/>
         </p:nvCxnSpPr>
         <p:spPr>
-          <a:xfrm>
-            <a:off x="1544804" y="5045233"/>
-            <a:ext cx="0" cy="1585153"/>
+          <a:xfrm flipH="1">
+            <a:off x="1544804" y="5100201"/>
+            <a:ext cx="11374" cy="1530185"/>
           </a:xfrm>
           <a:prstGeom prst="straightConnector1">
             <a:avLst/>
@@ -4069,8 +4100,8 @@
         </p:nvCxnSpPr>
         <p:spPr>
           <a:xfrm flipH="1">
-            <a:off x="1556178" y="2997102"/>
-            <a:ext cx="2084929" cy="0"/>
+            <a:off x="1556179" y="2997102"/>
+            <a:ext cx="2084928" cy="0"/>
           </a:xfrm>
           <a:prstGeom prst="straightConnector1">
             <a:avLst/>

</xml_diff>